<commit_message>
First push in a while...
</commit_message>
<xml_diff>
--- a/analyses/Figure_montaging [Autosaved].pptx
+++ b/analyses/Figure_montaging [Autosaved].pptx
@@ -260,7 +260,7 @@
           <a:p>
             <a:fld id="{542C9660-1722-AD44-BA80-85FEAAF3EA5E}" type="datetimeFigureOut">
               <a:rPr lang="en-US" smtClean="0"/>
-              <a:t>1/9/21</a:t>
+              <a:t>6/11/21</a:t>
             </a:fld>
             <a:endParaRPr lang="en-US"/>
           </a:p>
@@ -458,7 +458,7 @@
           <a:p>
             <a:fld id="{542C9660-1722-AD44-BA80-85FEAAF3EA5E}" type="datetimeFigureOut">
               <a:rPr lang="en-US" smtClean="0"/>
-              <a:t>1/9/21</a:t>
+              <a:t>6/11/21</a:t>
             </a:fld>
             <a:endParaRPr lang="en-US"/>
           </a:p>
@@ -666,7 +666,7 @@
           <a:p>
             <a:fld id="{542C9660-1722-AD44-BA80-85FEAAF3EA5E}" type="datetimeFigureOut">
               <a:rPr lang="en-US" smtClean="0"/>
-              <a:t>1/9/21</a:t>
+              <a:t>6/11/21</a:t>
             </a:fld>
             <a:endParaRPr lang="en-US"/>
           </a:p>
@@ -864,7 +864,7 @@
           <a:p>
             <a:fld id="{542C9660-1722-AD44-BA80-85FEAAF3EA5E}" type="datetimeFigureOut">
               <a:rPr lang="en-US" smtClean="0"/>
-              <a:t>1/9/21</a:t>
+              <a:t>6/11/21</a:t>
             </a:fld>
             <a:endParaRPr lang="en-US"/>
           </a:p>
@@ -1139,7 +1139,7 @@
           <a:p>
             <a:fld id="{542C9660-1722-AD44-BA80-85FEAAF3EA5E}" type="datetimeFigureOut">
               <a:rPr lang="en-US" smtClean="0"/>
-              <a:t>1/9/21</a:t>
+              <a:t>6/11/21</a:t>
             </a:fld>
             <a:endParaRPr lang="en-US"/>
           </a:p>
@@ -1404,7 +1404,7 @@
           <a:p>
             <a:fld id="{542C9660-1722-AD44-BA80-85FEAAF3EA5E}" type="datetimeFigureOut">
               <a:rPr lang="en-US" smtClean="0"/>
-              <a:t>1/9/21</a:t>
+              <a:t>6/11/21</a:t>
             </a:fld>
             <a:endParaRPr lang="en-US"/>
           </a:p>
@@ -1816,7 +1816,7 @@
           <a:p>
             <a:fld id="{542C9660-1722-AD44-BA80-85FEAAF3EA5E}" type="datetimeFigureOut">
               <a:rPr lang="en-US" smtClean="0"/>
-              <a:t>1/9/21</a:t>
+              <a:t>6/11/21</a:t>
             </a:fld>
             <a:endParaRPr lang="en-US"/>
           </a:p>
@@ -1957,7 +1957,7 @@
           <a:p>
             <a:fld id="{542C9660-1722-AD44-BA80-85FEAAF3EA5E}" type="datetimeFigureOut">
               <a:rPr lang="en-US" smtClean="0"/>
-              <a:t>1/9/21</a:t>
+              <a:t>6/11/21</a:t>
             </a:fld>
             <a:endParaRPr lang="en-US"/>
           </a:p>
@@ -2070,7 +2070,7 @@
           <a:p>
             <a:fld id="{542C9660-1722-AD44-BA80-85FEAAF3EA5E}" type="datetimeFigureOut">
               <a:rPr lang="en-US" smtClean="0"/>
-              <a:t>1/9/21</a:t>
+              <a:t>6/11/21</a:t>
             </a:fld>
             <a:endParaRPr lang="en-US"/>
           </a:p>
@@ -2381,7 +2381,7 @@
           <a:p>
             <a:fld id="{542C9660-1722-AD44-BA80-85FEAAF3EA5E}" type="datetimeFigureOut">
               <a:rPr lang="en-US" smtClean="0"/>
-              <a:t>1/9/21</a:t>
+              <a:t>6/11/21</a:t>
             </a:fld>
             <a:endParaRPr lang="en-US"/>
           </a:p>
@@ -2669,7 +2669,7 @@
           <a:p>
             <a:fld id="{542C9660-1722-AD44-BA80-85FEAAF3EA5E}" type="datetimeFigureOut">
               <a:rPr lang="en-US" smtClean="0"/>
-              <a:t>1/9/21</a:t>
+              <a:t>6/11/21</a:t>
             </a:fld>
             <a:endParaRPr lang="en-US"/>
           </a:p>
@@ -2910,7 +2910,7 @@
           <a:p>
             <a:fld id="{542C9660-1722-AD44-BA80-85FEAAF3EA5E}" type="datetimeFigureOut">
               <a:rPr lang="en-US" smtClean="0"/>
-              <a:t>1/9/21</a:t>
+              <a:t>6/11/21</a:t>
             </a:fld>
             <a:endParaRPr lang="en-US"/>
           </a:p>
@@ -3343,9 +3343,8 @@
         </p:nvPicPr>
         <p:blipFill>
           <a:blip r:embed="rId2"/>
-          <a:stretch>
-            <a:fillRect/>
-          </a:stretch>
+          <a:srcRect/>
+          <a:stretch/>
         </p:blipFill>
         <p:spPr>
           <a:xfrm>
@@ -3408,14 +3407,13 @@
         </p:nvPicPr>
         <p:blipFill>
           <a:blip r:embed="rId3"/>
-          <a:stretch>
-            <a:fillRect/>
-          </a:stretch>
+          <a:srcRect/>
+          <a:stretch/>
         </p:blipFill>
         <p:spPr>
           <a:xfrm>
-            <a:off x="5658507" y="342864"/>
-            <a:ext cx="3078892" cy="6157784"/>
+            <a:off x="5618454" y="283779"/>
+            <a:ext cx="3153104" cy="6306207"/>
           </a:xfrm>
           <a:prstGeom prst="rect">
             <a:avLst/>
@@ -3474,7 +3472,7 @@
         <p:spPr>
           <a:xfrm>
             <a:off x="588580" y="210206"/>
-            <a:ext cx="3421119" cy="4887312"/>
+            <a:ext cx="3421118" cy="4887312"/>
           </a:xfrm>
           <a:prstGeom prst="rect">
             <a:avLst/>
@@ -3532,9 +3530,8 @@
         </p:nvPicPr>
         <p:blipFill>
           <a:blip r:embed="rId3"/>
-          <a:stretch>
-            <a:fillRect/>
-          </a:stretch>
+          <a:srcRect/>
+          <a:stretch/>
         </p:blipFill>
         <p:spPr>
           <a:xfrm>

</xml_diff>